<commit_message>
update lock. fig4 done. table1 started
</commit_message>
<xml_diff>
--- a/outputs/figures/manuscript_figures/04_figure4.pptx
+++ b/outputs/figures/manuscript_figures/04_figure4.pptx
@@ -254,7 +254,7 @@
           <a:p>
             <a:fld id="{4762B47D-56A3-4A49-9568-0C219176BBE0}" type="datetimeFigureOut">
               <a:rPr lang="fr-CA" smtClean="0"/>
-              <a:t>2022-01-18</a:t>
+              <a:t>2022-01-19</a:t>
             </a:fld>
             <a:endParaRPr lang="fr-CA"/>
           </a:p>
@@ -424,7 +424,7 @@
           <a:p>
             <a:fld id="{4762B47D-56A3-4A49-9568-0C219176BBE0}" type="datetimeFigureOut">
               <a:rPr lang="fr-CA" smtClean="0"/>
-              <a:t>2022-01-18</a:t>
+              <a:t>2022-01-19</a:t>
             </a:fld>
             <a:endParaRPr lang="fr-CA"/>
           </a:p>
@@ -604,7 +604,7 @@
           <a:p>
             <a:fld id="{4762B47D-56A3-4A49-9568-0C219176BBE0}" type="datetimeFigureOut">
               <a:rPr lang="fr-CA" smtClean="0"/>
-              <a:t>2022-01-18</a:t>
+              <a:t>2022-01-19</a:t>
             </a:fld>
             <a:endParaRPr lang="fr-CA"/>
           </a:p>
@@ -774,7 +774,7 @@
           <a:p>
             <a:fld id="{4762B47D-56A3-4A49-9568-0C219176BBE0}" type="datetimeFigureOut">
               <a:rPr lang="fr-CA" smtClean="0"/>
-              <a:t>2022-01-18</a:t>
+              <a:t>2022-01-19</a:t>
             </a:fld>
             <a:endParaRPr lang="fr-CA"/>
           </a:p>
@@ -1020,7 +1020,7 @@
           <a:p>
             <a:fld id="{4762B47D-56A3-4A49-9568-0C219176BBE0}" type="datetimeFigureOut">
               <a:rPr lang="fr-CA" smtClean="0"/>
-              <a:t>2022-01-18</a:t>
+              <a:t>2022-01-19</a:t>
             </a:fld>
             <a:endParaRPr lang="fr-CA"/>
           </a:p>
@@ -1252,7 +1252,7 @@
           <a:p>
             <a:fld id="{4762B47D-56A3-4A49-9568-0C219176BBE0}" type="datetimeFigureOut">
               <a:rPr lang="fr-CA" smtClean="0"/>
-              <a:t>2022-01-18</a:t>
+              <a:t>2022-01-19</a:t>
             </a:fld>
             <a:endParaRPr lang="fr-CA"/>
           </a:p>
@@ -1619,7 +1619,7 @@
           <a:p>
             <a:fld id="{4762B47D-56A3-4A49-9568-0C219176BBE0}" type="datetimeFigureOut">
               <a:rPr lang="fr-CA" smtClean="0"/>
-              <a:t>2022-01-18</a:t>
+              <a:t>2022-01-19</a:t>
             </a:fld>
             <a:endParaRPr lang="fr-CA"/>
           </a:p>
@@ -1737,7 +1737,7 @@
           <a:p>
             <a:fld id="{4762B47D-56A3-4A49-9568-0C219176BBE0}" type="datetimeFigureOut">
               <a:rPr lang="fr-CA" smtClean="0"/>
-              <a:t>2022-01-18</a:t>
+              <a:t>2022-01-19</a:t>
             </a:fld>
             <a:endParaRPr lang="fr-CA"/>
           </a:p>
@@ -1832,7 +1832,7 @@
           <a:p>
             <a:fld id="{4762B47D-56A3-4A49-9568-0C219176BBE0}" type="datetimeFigureOut">
               <a:rPr lang="fr-CA" smtClean="0"/>
-              <a:t>2022-01-18</a:t>
+              <a:t>2022-01-19</a:t>
             </a:fld>
             <a:endParaRPr lang="fr-CA"/>
           </a:p>
@@ -2109,7 +2109,7 @@
           <a:p>
             <a:fld id="{4762B47D-56A3-4A49-9568-0C219176BBE0}" type="datetimeFigureOut">
               <a:rPr lang="fr-CA" smtClean="0"/>
-              <a:t>2022-01-18</a:t>
+              <a:t>2022-01-19</a:t>
             </a:fld>
             <a:endParaRPr lang="fr-CA"/>
           </a:p>
@@ -2362,7 +2362,7 @@
           <a:p>
             <a:fld id="{4762B47D-56A3-4A49-9568-0C219176BBE0}" type="datetimeFigureOut">
               <a:rPr lang="fr-CA" smtClean="0"/>
-              <a:t>2022-01-18</a:t>
+              <a:t>2022-01-19</a:t>
             </a:fld>
             <a:endParaRPr lang="fr-CA"/>
           </a:p>
@@ -2575,7 +2575,7 @@
           <a:p>
             <a:fld id="{4762B47D-56A3-4A49-9568-0C219176BBE0}" type="datetimeFigureOut">
               <a:rPr lang="fr-CA" smtClean="0"/>
-              <a:t>2022-01-18</a:t>
+              <a:t>2022-01-19</a:t>
             </a:fld>
             <a:endParaRPr lang="fr-CA"/>
           </a:p>
@@ -3150,7 +3150,7 @@
               </p:nvSpPr>
               <p:spPr>
                 <a:xfrm>
-                  <a:off x="1020318" y="3314271"/>
+                  <a:off x="1020318" y="3331205"/>
                   <a:ext cx="1612800" cy="277200"/>
                 </a:xfrm>
                 <a:prstGeom prst="rect">
@@ -3268,7 +3268,7 @@
               </p:nvSpPr>
               <p:spPr>
                 <a:xfrm>
-                  <a:off x="4781007" y="3319271"/>
+                  <a:off x="4881235" y="3334893"/>
                   <a:ext cx="2019634" cy="277200"/>
                 </a:xfrm>
                 <a:prstGeom prst="rect">
@@ -3402,7 +3402,7 @@
               </p:nvSpPr>
               <p:spPr>
                 <a:xfrm>
-                  <a:off x="9133160" y="3314427"/>
+                  <a:off x="9133160" y="3331361"/>
                   <a:ext cx="1612800" cy="277200"/>
                 </a:xfrm>
                 <a:prstGeom prst="rect">
@@ -3453,7 +3453,7 @@
               </p:nvSpPr>
               <p:spPr>
                 <a:xfrm rot="16200000">
-                  <a:off x="6958232" y="1796763"/>
+                  <a:off x="6958232" y="1737362"/>
                   <a:ext cx="1836000" cy="276999"/>
                 </a:xfrm>
                 <a:prstGeom prst="rect">
@@ -3541,7 +3541,7 @@
               </p:nvSpPr>
               <p:spPr>
                 <a:xfrm rot="16200000">
-                  <a:off x="-1151507" y="5019980"/>
+                  <a:off x="-1151696" y="4976557"/>
                   <a:ext cx="1836031" cy="277200"/>
                 </a:xfrm>
                 <a:prstGeom prst="rect">
@@ -3636,7 +3636,7 @@
               </p:nvSpPr>
               <p:spPr>
                 <a:xfrm rot="16200000">
-                  <a:off x="3037410" y="5042504"/>
+                  <a:off x="3037717" y="5017456"/>
                   <a:ext cx="1669119" cy="277200"/>
                 </a:xfrm>
                 <a:prstGeom prst="rect">
@@ -3738,7 +3738,7 @@
               </p:nvSpPr>
               <p:spPr>
                 <a:xfrm rot="16200000">
-                  <a:off x="7054143" y="5042503"/>
+                  <a:off x="7053699" y="5042504"/>
                   <a:ext cx="1669119" cy="277200"/>
                 </a:xfrm>
                 <a:prstGeom prst="rect">

</xml_diff>